<commit_message>
Steve has already updated the slides
</commit_message>
<xml_diff>
--- a/alternativeDYyield.pptx
+++ b/alternativeDYyield.pptx
@@ -5,7 +5,7 @@
     <p:sldMasterId id="2147483648" r:id="rId1"/>
   </p:sldMasterIdLst>
   <p:notesMasterIdLst>
-    <p:notesMasterId r:id="rId13"/>
+    <p:notesMasterId r:id="rId14"/>
   </p:notesMasterIdLst>
   <p:sldIdLst>
     <p:sldId id="256" r:id="rId2"/>
@@ -18,7 +18,8 @@
     <p:sldId id="989" r:id="rId9"/>
     <p:sldId id="990" r:id="rId10"/>
     <p:sldId id="991" r:id="rId11"/>
-    <p:sldId id="258" r:id="rId12"/>
+    <p:sldId id="992" r:id="rId12"/>
+    <p:sldId id="258" r:id="rId13"/>
   </p:sldIdLst>
   <p:sldSz cx="12192000" cy="6858000"/>
   <p:notesSz cx="6858000" cy="9144000"/>
@@ -207,7 +208,7 @@
           <a:p>
             <a:fld id="{709801DF-40BB-6947-8E30-75CC903E7784}" type="datetimeFigureOut">
               <a:rPr lang="en-US" smtClean="0"/>
-              <a:t>8/15/25</a:t>
+              <a:t>8/19/25</a:t>
             </a:fld>
             <a:endParaRPr lang="en-US"/>
           </a:p>
@@ -1129,7 +1130,7 @@
           <a:p>
             <a:fld id="{6E75DE6B-DA19-FB44-9427-AF73A9C4EBC0}" type="datetime1">
               <a:rPr lang="en-US" smtClean="0"/>
-              <a:t>8/15/25</a:t>
+              <a:t>8/19/25</a:t>
             </a:fld>
             <a:endParaRPr lang="en-US"/>
           </a:p>
@@ -1327,7 +1328,7 @@
           <a:p>
             <a:fld id="{3BF3CBBA-1145-9043-B386-5741245D7DDC}" type="datetime1">
               <a:rPr lang="en-US" smtClean="0"/>
-              <a:t>8/15/25</a:t>
+              <a:t>8/19/25</a:t>
             </a:fld>
             <a:endParaRPr lang="en-US"/>
           </a:p>
@@ -1535,7 +1536,7 @@
           <a:p>
             <a:fld id="{0CEB9593-4C10-2648-BB43-48FE36ED9019}" type="datetime1">
               <a:rPr lang="en-US" smtClean="0"/>
-              <a:t>8/15/25</a:t>
+              <a:t>8/19/25</a:t>
             </a:fld>
             <a:endParaRPr lang="en-US"/>
           </a:p>
@@ -1733,7 +1734,7 @@
           <a:p>
             <a:fld id="{3B9977D7-0EE6-4641-8458-2B150046FE11}" type="datetime1">
               <a:rPr lang="en-US" smtClean="0"/>
-              <a:t>8/15/25</a:t>
+              <a:t>8/19/25</a:t>
             </a:fld>
             <a:endParaRPr lang="en-US"/>
           </a:p>
@@ -2008,7 +2009,7 @@
           <a:p>
             <a:fld id="{3AB3E8B4-C41B-714E-90AA-B74C9E0AAE93}" type="datetime1">
               <a:rPr lang="en-US" smtClean="0"/>
-              <a:t>8/15/25</a:t>
+              <a:t>8/19/25</a:t>
             </a:fld>
             <a:endParaRPr lang="en-US"/>
           </a:p>
@@ -2273,7 +2274,7 @@
           <a:p>
             <a:fld id="{13F30895-CB33-4643-86A3-AD22D03BB547}" type="datetime1">
               <a:rPr lang="en-US" smtClean="0"/>
-              <a:t>8/15/25</a:t>
+              <a:t>8/19/25</a:t>
             </a:fld>
             <a:endParaRPr lang="en-US"/>
           </a:p>
@@ -2685,7 +2686,7 @@
           <a:p>
             <a:fld id="{E29A2B63-C740-724D-8738-C53BCFA43DEF}" type="datetime1">
               <a:rPr lang="en-US" smtClean="0"/>
-              <a:t>8/15/25</a:t>
+              <a:t>8/19/25</a:t>
             </a:fld>
             <a:endParaRPr lang="en-US"/>
           </a:p>
@@ -2826,7 +2827,7 @@
           <a:p>
             <a:fld id="{4BD2E315-A32D-CD48-9FD3-CD8AF44D0F4F}" type="datetime1">
               <a:rPr lang="en-US" smtClean="0"/>
-              <a:t>8/15/25</a:t>
+              <a:t>8/19/25</a:t>
             </a:fld>
             <a:endParaRPr lang="en-US"/>
           </a:p>
@@ -2939,7 +2940,7 @@
           <a:p>
             <a:fld id="{8A9361B6-EB4D-A047-8AFE-7404E903F6B3}" type="datetime1">
               <a:rPr lang="en-US" smtClean="0"/>
-              <a:t>8/15/25</a:t>
+              <a:t>8/19/25</a:t>
             </a:fld>
             <a:endParaRPr lang="en-US"/>
           </a:p>
@@ -3250,7 +3251,7 @@
           <a:p>
             <a:fld id="{560287B4-E51D-7048-9B88-C9F8B3849C38}" type="datetime1">
               <a:rPr lang="en-US" smtClean="0"/>
-              <a:t>8/15/25</a:t>
+              <a:t>8/19/25</a:t>
             </a:fld>
             <a:endParaRPr lang="en-US"/>
           </a:p>
@@ -3538,7 +3539,7 @@
           <a:p>
             <a:fld id="{80B8B28A-2D03-9B43-9EAB-9EE5794F6F30}" type="datetime1">
               <a:rPr lang="en-US" smtClean="0"/>
-              <a:t>8/15/25</a:t>
+              <a:t>8/19/25</a:t>
             </a:fld>
             <a:endParaRPr lang="en-US"/>
           </a:p>
@@ -3779,7 +3780,7 @@
           <a:p>
             <a:fld id="{3FF6ED76-5959-6444-8C19-4C4A49FFC05E}" type="datetime1">
               <a:rPr lang="en-US" smtClean="0"/>
-              <a:t>8/15/25</a:t>
+              <a:t>8/19/25</a:t>
             </a:fld>
             <a:endParaRPr lang="en-US"/>
           </a:p>
@@ -4260,7 +4261,7 @@
           <a:p>
             <a:r>
               <a:rPr lang="en-US" dirty="0"/>
-              <a:t>August 2025</a:t>
+              <a:t>19 August 2025</a:t>
             </a:r>
           </a:p>
         </p:txBody>
@@ -4288,7 +4289,7 @@
           <a:p>
             <a:fld id="{B973B54B-2676-1B40-A5C8-84292047B6BF}" type="datetime1">
               <a:rPr lang="en-US" smtClean="0"/>
-              <a:t>8/15/25</a:t>
+              <a:t>8/19/25</a:t>
             </a:fld>
             <a:endParaRPr lang="en-US"/>
           </a:p>
@@ -4411,7 +4412,31 @@
               <a:rPr lang="en-US" sz="4000" dirty="0">
                 <a:cs typeface="Arial" panose="020B0604020202020204" pitchFamily="34" charset="0"/>
               </a:rPr>
-              <a:t>NMSU Mix Vs RS-67 Flask</a:t>
+              <a:t>RS-67:  NMSU </a:t>
+            </a:r>
+            <a:r>
+              <a:rPr lang="en-US" sz="4000" dirty="0">
+                <a:solidFill>
+                  <a:srgbClr val="FF0000"/>
+                </a:solidFill>
+                <a:cs typeface="Arial" panose="020B0604020202020204" pitchFamily="34" charset="0"/>
+              </a:rPr>
+              <a:t>LH2 Mix </a:t>
+            </a:r>
+            <a:r>
+              <a:rPr lang="en-US" sz="4000" dirty="0">
+                <a:cs typeface="Arial" panose="020B0604020202020204" pitchFamily="34" charset="0"/>
+              </a:rPr>
+              <a:t>vs </a:t>
+            </a:r>
+            <a:r>
+              <a:rPr lang="en-US" sz="4000" dirty="0">
+                <a:solidFill>
+                  <a:srgbClr val="0070C0"/>
+                </a:solidFill>
+                <a:cs typeface="Arial" panose="020B0604020202020204" pitchFamily="34" charset="0"/>
+              </a:rPr>
+              <a:t>Flask Mix</a:t>
             </a:r>
           </a:p>
         </p:txBody>
@@ -4448,10 +4473,10 @@
       </p:pic>
       <p:sp>
         <p:nvSpPr>
-          <p:cNvPr id="11" name="TextBox 10">
-            <a:extLst>
-              <a:ext uri="{FF2B5EF4-FFF2-40B4-BE49-F238E27FC236}">
-                <a16:creationId xmlns:a16="http://schemas.microsoft.com/office/drawing/2014/main" id="{B6D447BF-C5C6-5C35-B62F-AD155C4951F2}"/>
+          <p:cNvPr id="12" name="TextBox 11">
+            <a:extLst>
+              <a:ext uri="{FF2B5EF4-FFF2-40B4-BE49-F238E27FC236}">
+                <a16:creationId xmlns:a16="http://schemas.microsoft.com/office/drawing/2014/main" id="{D89F7C60-CB15-A68A-7E76-D8A9241BF1EB}"/>
               </a:ext>
             </a:extLst>
           </p:cNvPr>
@@ -4460,8 +4485,8 @@
         </p:nvSpPr>
         <p:spPr>
           <a:xfrm>
-            <a:off x="6268273" y="5250419"/>
-            <a:ext cx="5812810" cy="246221"/>
+            <a:off x="1194544" y="5323803"/>
+            <a:ext cx="4161227" cy="523220"/>
           </a:xfrm>
           <a:prstGeom prst="rect">
             <a:avLst/>
@@ -4469,49 +4494,14 @@
           <a:noFill/>
         </p:spPr>
         <p:txBody>
-          <a:bodyPr wrap="none" rtlCol="0">
+          <a:bodyPr wrap="square" rtlCol="0">
             <a:spAutoFit/>
           </a:bodyPr>
           <a:lstStyle/>
           <a:p>
             <a:r>
-              <a:rPr lang="en-US" sz="1000" dirty="0"/>
-              <a:t>Comparison between NMSU mix Vs RS-67 flask mix spectra (after event selection and area normalized)</a:t>
-            </a:r>
-          </a:p>
-        </p:txBody>
-      </p:sp>
-      <p:sp>
-        <p:nvSpPr>
-          <p:cNvPr id="12" name="TextBox 11">
-            <a:extLst>
-              <a:ext uri="{FF2B5EF4-FFF2-40B4-BE49-F238E27FC236}">
-                <a16:creationId xmlns:a16="http://schemas.microsoft.com/office/drawing/2014/main" id="{D89F7C60-CB15-A68A-7E76-D8A9241BF1EB}"/>
-              </a:ext>
-            </a:extLst>
-          </p:cNvPr>
-          <p:cNvSpPr txBox="1"/>
-          <p:nvPr/>
-        </p:nvSpPr>
-        <p:spPr>
-          <a:xfrm>
-            <a:off x="763470" y="5250420"/>
-            <a:ext cx="4679486" cy="246221"/>
-          </a:xfrm>
-          <a:prstGeom prst="rect">
-            <a:avLst/>
-          </a:prstGeom>
-          <a:noFill/>
-        </p:spPr>
-        <p:txBody>
-          <a:bodyPr wrap="none" rtlCol="0">
-            <a:spAutoFit/>
-          </a:bodyPr>
-          <a:lstStyle/>
-          <a:p>
-            <a:r>
-              <a:rPr lang="en-US" sz="1000" dirty="0"/>
-              <a:t>Comparison between NMSU mix Vs RS-67 flask mix spectra (after event selection)</a:t>
+              <a:rPr lang="en-US" sz="1400" dirty="0"/>
+              <a:t>Comparison between LH2 mix vs Flask mix spectra (after event selection)</a:t>
             </a:r>
           </a:p>
         </p:txBody>
@@ -4614,6 +4604,162 @@
           </a:p>
         </p:txBody>
       </p:sp>
+      <p:sp>
+        <p:nvSpPr>
+          <p:cNvPr id="2" name="TextBox 1">
+            <a:extLst>
+              <a:ext uri="{FF2B5EF4-FFF2-40B4-BE49-F238E27FC236}">
+                <a16:creationId xmlns:a16="http://schemas.microsoft.com/office/drawing/2014/main" id="{E3AFB695-49CA-5013-5619-AB32FF572A17}"/>
+              </a:ext>
+            </a:extLst>
+          </p:cNvPr>
+          <p:cNvSpPr txBox="1"/>
+          <p:nvPr/>
+        </p:nvSpPr>
+        <p:spPr>
+          <a:xfrm>
+            <a:off x="3575462" y="2142309"/>
+            <a:ext cx="1375361" cy="646331"/>
+          </a:xfrm>
+          <a:prstGeom prst="rect">
+            <a:avLst/>
+          </a:prstGeom>
+          <a:solidFill>
+            <a:schemeClr val="bg1"/>
+          </a:solidFill>
+        </p:spPr>
+        <p:txBody>
+          <a:bodyPr wrap="square" rtlCol="0">
+            <a:spAutoFit/>
+          </a:bodyPr>
+          <a:lstStyle/>
+          <a:p>
+            <a:r>
+              <a:rPr lang="en-US" dirty="0"/>
+              <a:t>LH2 Mix</a:t>
+            </a:r>
+          </a:p>
+          <a:p>
+            <a:r>
+              <a:rPr lang="en-US" dirty="0"/>
+              <a:t>Flask Mix</a:t>
+            </a:r>
+          </a:p>
+        </p:txBody>
+      </p:sp>
+      <p:sp>
+        <p:nvSpPr>
+          <p:cNvPr id="3" name="TextBox 2">
+            <a:extLst>
+              <a:ext uri="{FF2B5EF4-FFF2-40B4-BE49-F238E27FC236}">
+                <a16:creationId xmlns:a16="http://schemas.microsoft.com/office/drawing/2014/main" id="{2F2614EA-56D5-6D48-ED77-BA20925B4AFF}"/>
+              </a:ext>
+            </a:extLst>
+          </p:cNvPr>
+          <p:cNvSpPr txBox="1"/>
+          <p:nvPr/>
+        </p:nvSpPr>
+        <p:spPr>
+          <a:xfrm>
+            <a:off x="9684525" y="2142309"/>
+            <a:ext cx="1375361" cy="646331"/>
+          </a:xfrm>
+          <a:prstGeom prst="rect">
+            <a:avLst/>
+          </a:prstGeom>
+          <a:solidFill>
+            <a:schemeClr val="bg1"/>
+          </a:solidFill>
+        </p:spPr>
+        <p:txBody>
+          <a:bodyPr wrap="square" rtlCol="0">
+            <a:spAutoFit/>
+          </a:bodyPr>
+          <a:lstStyle/>
+          <a:p>
+            <a:r>
+              <a:rPr lang="en-US" dirty="0"/>
+              <a:t>LH2 Mix</a:t>
+            </a:r>
+          </a:p>
+          <a:p>
+            <a:r>
+              <a:rPr lang="en-US" dirty="0"/>
+              <a:t>Flask Mix</a:t>
+            </a:r>
+          </a:p>
+        </p:txBody>
+      </p:sp>
+      <p:sp>
+        <p:nvSpPr>
+          <p:cNvPr id="4" name="TextBox 3">
+            <a:extLst>
+              <a:ext uri="{FF2B5EF4-FFF2-40B4-BE49-F238E27FC236}">
+                <a16:creationId xmlns:a16="http://schemas.microsoft.com/office/drawing/2014/main" id="{4EDE13F9-5C2C-2CDB-5CD9-803D666CB55A}"/>
+              </a:ext>
+            </a:extLst>
+          </p:cNvPr>
+          <p:cNvSpPr txBox="1"/>
+          <p:nvPr/>
+        </p:nvSpPr>
+        <p:spPr>
+          <a:xfrm>
+            <a:off x="6715778" y="5323803"/>
+            <a:ext cx="4161227" cy="523220"/>
+          </a:xfrm>
+          <a:prstGeom prst="rect">
+            <a:avLst/>
+          </a:prstGeom>
+          <a:noFill/>
+        </p:spPr>
+        <p:txBody>
+          <a:bodyPr wrap="square" rtlCol="0">
+            <a:spAutoFit/>
+          </a:bodyPr>
+          <a:lstStyle/>
+          <a:p>
+            <a:r>
+              <a:rPr lang="en-US" sz="1400" dirty="0"/>
+              <a:t>Comparison between LH2 mix vs Flask mix spectra (after event selection) –- area normalized</a:t>
+            </a:r>
+          </a:p>
+        </p:txBody>
+      </p:sp>
+      <p:sp>
+        <p:nvSpPr>
+          <p:cNvPr id="6" name="TextBox 5">
+            <a:extLst>
+              <a:ext uri="{FF2B5EF4-FFF2-40B4-BE49-F238E27FC236}">
+                <a16:creationId xmlns:a16="http://schemas.microsoft.com/office/drawing/2014/main" id="{29ECF21B-C16D-CBA4-2B43-89B785EFE184}"/>
+              </a:ext>
+            </a:extLst>
+          </p:cNvPr>
+          <p:cNvSpPr txBox="1"/>
+          <p:nvPr/>
+        </p:nvSpPr>
+        <p:spPr>
+          <a:xfrm>
+            <a:off x="391886" y="5886212"/>
+            <a:ext cx="11469188" cy="646331"/>
+          </a:xfrm>
+          <a:prstGeom prst="rect">
+            <a:avLst/>
+          </a:prstGeom>
+          <a:noFill/>
+        </p:spPr>
+        <p:txBody>
+          <a:bodyPr wrap="square" rtlCol="0">
+            <a:spAutoFit/>
+          </a:bodyPr>
+          <a:lstStyle/>
+          <a:p>
+            <a:r>
+              <a:rPr lang="en-US" dirty="0"/>
+              <a:t>The LH2 mixed-event and Flask mixed-event distributions have the same shape.  If you don’t explicitly use the flask mixed spectra, then the mass-fit will boost the LH2 mixed component to make up for it.  (See previous page.)</a:t>
+            </a:r>
+          </a:p>
+        </p:txBody>
+      </p:sp>
     </p:spTree>
     <p:extLst>
       <p:ext uri="{BB962C8B-B14F-4D97-AF65-F5344CB8AC3E}">
@@ -4628,6 +4774,278 @@
 </file>
 
 <file path=ppt/slides/slide11.xml><?xml version="1.0" encoding="utf-8"?>
+<p:sld xmlns:a="http://schemas.openxmlformats.org/drawingml/2006/main" xmlns:r="http://schemas.openxmlformats.org/officeDocument/2006/relationships" xmlns:p="http://schemas.openxmlformats.org/presentationml/2006/main">
+  <p:cSld>
+    <p:spTree>
+      <p:nvGrpSpPr>
+        <p:cNvPr id="1" name=""/>
+        <p:cNvGrpSpPr/>
+        <p:nvPr/>
+      </p:nvGrpSpPr>
+      <p:grpSpPr>
+        <a:xfrm>
+          <a:off x="0" y="0"/>
+          <a:ext cx="0" cy="0"/>
+          <a:chOff x="0" y="0"/>
+          <a:chExt cx="0" cy="0"/>
+        </a:xfrm>
+      </p:grpSpPr>
+      <mc:AlternateContent xmlns:mc="http://schemas.openxmlformats.org/markup-compatibility/2006">
+        <mc:Choice xmlns:a14="http://schemas.microsoft.com/office/drawing/2010/main" Requires="a14">
+          <p:sp>
+            <p:nvSpPr>
+              <p:cNvPr id="2" name="Title 1">
+                <a:extLst>
+                  <a:ext uri="{FF2B5EF4-FFF2-40B4-BE49-F238E27FC236}">
+                    <a16:creationId xmlns:a16="http://schemas.microsoft.com/office/drawing/2014/main" id="{6471C1BE-00A7-8538-06E8-B5D5B0AD68A1}"/>
+                  </a:ext>
+                </a:extLst>
+              </p:cNvPr>
+              <p:cNvSpPr>
+                <a:spLocks noGrp="1"/>
+              </p:cNvSpPr>
+              <p:nvPr>
+                <p:ph type="title"/>
+              </p:nvPr>
+            </p:nvSpPr>
+            <p:spPr/>
+            <p:txBody>
+              <a:bodyPr/>
+              <a:lstStyle/>
+              <a:p>
+                <a14:m>
+                  <m:oMath xmlns:m="http://schemas.openxmlformats.org/officeDocument/2006/math">
+                    <m:r>
+                      <a:rPr lang="en-US" i="1" dirty="0">
+                        <a:latin typeface="Cambria Math" panose="02040503050406030204" pitchFamily="18" charset="0"/>
+                      </a:rPr>
+                      <m:t>𝜓</m:t>
+                    </m:r>
+                    <m:r>
+                      <a:rPr lang="en-US" i="1" dirty="0">
+                        <a:latin typeface="Cambria Math" panose="02040503050406030204" pitchFamily="18" charset="0"/>
+                      </a:rPr>
+                      <m:t>′</m:t>
+                    </m:r>
+                  </m:oMath>
+                </a14:m>
+                <a:r>
+                  <a:rPr lang="en-US" dirty="0"/>
+                  <a:t> Contamination Summary</a:t>
+                </a:r>
+              </a:p>
+            </p:txBody>
+          </p:sp>
+        </mc:Choice>
+        <mc:Fallback>
+          <p:sp>
+            <p:nvSpPr>
+              <p:cNvPr id="2" name="Title 1">
+                <a:extLst>
+                  <a:ext uri="{FF2B5EF4-FFF2-40B4-BE49-F238E27FC236}">
+                    <a16:creationId xmlns:a16="http://schemas.microsoft.com/office/drawing/2014/main" id="{6471C1BE-00A7-8538-06E8-B5D5B0AD68A1}"/>
+                  </a:ext>
+                </a:extLst>
+              </p:cNvPr>
+              <p:cNvSpPr>
+                <a:spLocks noGrp="1" noRot="1" noChangeAspect="1" noMove="1" noResize="1" noEditPoints="1" noAdjustHandles="1" noChangeArrowheads="1" noChangeShapeType="1" noTextEdit="1"/>
+              </p:cNvSpPr>
+              <p:nvPr>
+                <p:ph type="title"/>
+              </p:nvPr>
+            </p:nvSpPr>
+            <p:spPr>
+              <a:blipFill>
+                <a:blip r:embed="rId2"/>
+                <a:stretch>
+                  <a:fillRect l="-1809"/>
+                </a:stretch>
+              </a:blipFill>
+            </p:spPr>
+            <p:txBody>
+              <a:bodyPr/>
+              <a:lstStyle/>
+              <a:p>
+                <a:r>
+                  <a:rPr lang="en-US">
+                    <a:noFill/>
+                  </a:rPr>
+                  <a:t> </a:t>
+                </a:r>
+              </a:p>
+            </p:txBody>
+          </p:sp>
+        </mc:Fallback>
+      </mc:AlternateContent>
+      <mc:AlternateContent xmlns:mc="http://schemas.openxmlformats.org/markup-compatibility/2006">
+        <mc:Choice xmlns:a14="http://schemas.microsoft.com/office/drawing/2010/main" Requires="a14">
+          <p:sp>
+            <p:nvSpPr>
+              <p:cNvPr id="3" name="Content Placeholder 2">
+                <a:extLst>
+                  <a:ext uri="{FF2B5EF4-FFF2-40B4-BE49-F238E27FC236}">
+                    <a16:creationId xmlns:a16="http://schemas.microsoft.com/office/drawing/2014/main" id="{310FBB09-9610-6AC6-4481-05D55096C32D}"/>
+                  </a:ext>
+                </a:extLst>
+              </p:cNvPr>
+              <p:cNvSpPr>
+                <a:spLocks noGrp="1"/>
+              </p:cNvSpPr>
+              <p:nvPr>
+                <p:ph idx="1"/>
+              </p:nvPr>
+            </p:nvSpPr>
+            <p:spPr/>
+            <p:txBody>
+              <a:bodyPr/>
+              <a:lstStyle/>
+              <a:p>
+                <a:r>
+                  <a:rPr lang="en-US" dirty="0"/>
+                  <a:t>Depending on assumptions made about the combinatoric background shape and normalization, the </a:t>
+                </a:r>
+                <a14:m>
+                  <m:oMath xmlns:m="http://schemas.openxmlformats.org/officeDocument/2006/math">
+                    <m:r>
+                      <a:rPr lang="en-US" i="1" dirty="0">
+                        <a:latin typeface="Cambria Math" panose="02040503050406030204" pitchFamily="18" charset="0"/>
+                      </a:rPr>
+                      <m:t>𝜓</m:t>
+                    </m:r>
+                    <m:r>
+                      <a:rPr lang="en-US" i="1" dirty="0">
+                        <a:latin typeface="Cambria Math" panose="02040503050406030204" pitchFamily="18" charset="0"/>
+                      </a:rPr>
+                      <m:t>′</m:t>
+                    </m:r>
+                  </m:oMath>
+                </a14:m>
+                <a:r>
+                  <a:rPr lang="en-US" dirty="0"/>
+                  <a:t> contamination (as a fraction of the total yield) overall is about 0.5% or less.</a:t>
+                </a:r>
+              </a:p>
+              <a:p>
+                <a:r>
+                  <a:rPr lang="en-US" dirty="0"/>
+                  <a:t>If you examine individual kinematic bins, the contamination can range from 0% to not more than 2%.</a:t>
+                </a:r>
+              </a:p>
+            </p:txBody>
+          </p:sp>
+        </mc:Choice>
+        <mc:Fallback>
+          <p:sp>
+            <p:nvSpPr>
+              <p:cNvPr id="3" name="Content Placeholder 2">
+                <a:extLst>
+                  <a:ext uri="{FF2B5EF4-FFF2-40B4-BE49-F238E27FC236}">
+                    <a16:creationId xmlns:a16="http://schemas.microsoft.com/office/drawing/2014/main" id="{310FBB09-9610-6AC6-4481-05D55096C32D}"/>
+                  </a:ext>
+                </a:extLst>
+              </p:cNvPr>
+              <p:cNvSpPr>
+                <a:spLocks noGrp="1" noRot="1" noChangeAspect="1" noMove="1" noResize="1" noEditPoints="1" noAdjustHandles="1" noChangeArrowheads="1" noChangeShapeType="1" noTextEdit="1"/>
+              </p:cNvSpPr>
+              <p:nvPr>
+                <p:ph idx="1"/>
+              </p:nvPr>
+            </p:nvSpPr>
+            <p:spPr>
+              <a:blipFill>
+                <a:blip r:embed="rId3"/>
+                <a:stretch>
+                  <a:fillRect l="-1086" t="-2326"/>
+                </a:stretch>
+              </a:blipFill>
+            </p:spPr>
+            <p:txBody>
+              <a:bodyPr/>
+              <a:lstStyle/>
+              <a:p>
+                <a:r>
+                  <a:rPr lang="en-US">
+                    <a:noFill/>
+                  </a:rPr>
+                  <a:t> </a:t>
+                </a:r>
+              </a:p>
+            </p:txBody>
+          </p:sp>
+        </mc:Fallback>
+      </mc:AlternateContent>
+      <p:sp>
+        <p:nvSpPr>
+          <p:cNvPr id="4" name="Date Placeholder 3">
+            <a:extLst>
+              <a:ext uri="{FF2B5EF4-FFF2-40B4-BE49-F238E27FC236}">
+                <a16:creationId xmlns:a16="http://schemas.microsoft.com/office/drawing/2014/main" id="{2765654B-4440-1D00-7626-1E30C929696D}"/>
+              </a:ext>
+            </a:extLst>
+          </p:cNvPr>
+          <p:cNvSpPr>
+            <a:spLocks noGrp="1"/>
+          </p:cNvSpPr>
+          <p:nvPr>
+            <p:ph type="dt" sz="half" idx="10"/>
+          </p:nvPr>
+        </p:nvSpPr>
+        <p:spPr/>
+        <p:txBody>
+          <a:bodyPr/>
+          <a:lstStyle/>
+          <a:p>
+            <a:fld id="{3B9977D7-0EE6-4641-8458-2B150046FE11}" type="datetime1">
+              <a:rPr lang="en-US" smtClean="0"/>
+              <a:t>8/19/25</a:t>
+            </a:fld>
+            <a:endParaRPr lang="en-US"/>
+          </a:p>
+        </p:txBody>
+      </p:sp>
+      <p:sp>
+        <p:nvSpPr>
+          <p:cNvPr id="5" name="Slide Number Placeholder 4">
+            <a:extLst>
+              <a:ext uri="{FF2B5EF4-FFF2-40B4-BE49-F238E27FC236}">
+                <a16:creationId xmlns:a16="http://schemas.microsoft.com/office/drawing/2014/main" id="{364DBD2A-DA45-6A56-8406-913B90DD0CDB}"/>
+              </a:ext>
+            </a:extLst>
+          </p:cNvPr>
+          <p:cNvSpPr>
+            <a:spLocks noGrp="1"/>
+          </p:cNvSpPr>
+          <p:nvPr>
+            <p:ph type="sldNum" sz="quarter" idx="12"/>
+          </p:nvPr>
+        </p:nvSpPr>
+        <p:spPr/>
+        <p:txBody>
+          <a:bodyPr/>
+          <a:lstStyle/>
+          <a:p>
+            <a:fld id="{8017FDCA-9457-E54C-8F9D-F4CD5ABC5619}" type="slidenum">
+              <a:rPr lang="en-US" smtClean="0"/>
+              <a:t>11</a:t>
+            </a:fld>
+            <a:endParaRPr lang="en-US"/>
+          </a:p>
+        </p:txBody>
+      </p:sp>
+    </p:spTree>
+    <p:extLst>
+      <p:ext uri="{BB962C8B-B14F-4D97-AF65-F5344CB8AC3E}">
+        <p14:creationId xmlns:p14="http://schemas.microsoft.com/office/powerpoint/2010/main" val="44806296"/>
+      </p:ext>
+    </p:extLst>
+  </p:cSld>
+  <p:clrMapOvr>
+    <a:masterClrMapping/>
+  </p:clrMapOvr>
+</p:sld>
+</file>
+
+<file path=ppt/slides/slide12.xml><?xml version="1.0" encoding="utf-8"?>
 <p:sld xmlns:a="http://schemas.openxmlformats.org/drawingml/2006/main" xmlns:r="http://schemas.openxmlformats.org/officeDocument/2006/relationships" xmlns:p="http://schemas.openxmlformats.org/presentationml/2006/main">
   <p:cSld>
     <p:spTree>
@@ -4680,7 +5098,7 @@
           <a:p>
             <a:r>
               <a:rPr lang="en-US" dirty="0"/>
-              <a:t>Proposal</a:t>
+              <a:t>Proposal for determination of DY Yield</a:t>
             </a:r>
           </a:p>
         </p:txBody>
@@ -5278,7 +5696,7 @@
           <a:p>
             <a:fld id="{7743A4F9-105C-D34C-AA0F-FFD2E4791154}" type="datetime1">
               <a:rPr lang="en-US" smtClean="0"/>
-              <a:t>8/15/25</a:t>
+              <a:t>8/19/25</a:t>
             </a:fld>
             <a:endParaRPr lang="en-US"/>
           </a:p>
@@ -5307,7 +5725,7 @@
           <a:p>
             <a:fld id="{8017FDCA-9457-E54C-8F9D-F4CD5ABC5619}" type="slidenum">
               <a:rPr lang="en-US" smtClean="0"/>
-              <a:t>11</a:t>
+              <a:t>12</a:t>
             </a:fld>
             <a:endParaRPr lang="en-US"/>
           </a:p>
@@ -5378,8 +5796,8 @@
           </a:p>
         </p:txBody>
       </p:sp>
-      <mc:AlternateContent xmlns:mc="http://schemas.openxmlformats.org/markup-compatibility/2006" xmlns:a14="http://schemas.microsoft.com/office/drawing/2010/main">
-        <mc:Choice Requires="a14">
+      <mc:AlternateContent xmlns:mc="http://schemas.openxmlformats.org/markup-compatibility/2006">
+        <mc:Choice xmlns:a14="http://schemas.microsoft.com/office/drawing/2010/main" Requires="a14">
           <p:sp>
             <p:nvSpPr>
               <p:cNvPr id="3" name="Content Placeholder 2">
@@ -5398,7 +5816,7 @@
             </p:nvSpPr>
             <p:spPr>
               <a:xfrm>
-                <a:off x="838199" y="940524"/>
+                <a:off x="367935" y="940524"/>
                 <a:ext cx="11218817" cy="5669915"/>
               </a:xfrm>
             </p:spPr>
@@ -5648,7 +6066,7 @@
             </p:txBody>
           </p:sp>
         </mc:Choice>
-        <mc:Fallback xmlns="">
+        <mc:Fallback>
           <p:sp>
             <p:nvSpPr>
               <p:cNvPr id="3" name="Content Placeholder 2">
@@ -5667,7 +6085,7 @@
             </p:nvSpPr>
             <p:spPr>
               <a:xfrm>
-                <a:off x="838199" y="940524"/>
+                <a:off x="367935" y="940524"/>
                 <a:ext cx="11218817" cy="5669915"/>
               </a:xfrm>
               <a:blipFill>
@@ -5715,7 +6133,7 @@
           <a:p>
             <a:fld id="{B9FACAE8-0C34-3549-B0F2-C1260A18A5E9}" type="datetime1">
               <a:rPr lang="en-US" smtClean="0"/>
-              <a:t>8/15/25</a:t>
+              <a:t>8/19/25</a:t>
             </a:fld>
             <a:endParaRPr lang="en-US"/>
           </a:p>
@@ -5833,7 +6251,7 @@
           <a:p>
             <a:fld id="{5D605D88-5EEA-6E46-99ED-8DAE2F38D7D4}" type="datetime1">
               <a:rPr lang="en-US" smtClean="0"/>
-              <a:t>8/15/25</a:t>
+              <a:t>8/19/25</a:t>
             </a:fld>
             <a:endParaRPr lang="en-US"/>
           </a:p>
@@ -6041,7 +6459,7 @@
           <a:p>
             <a:fld id="{04071618-D969-3D46-B63B-C6FF038D7AB1}" type="datetime1">
               <a:rPr lang="en-US" smtClean="0"/>
-              <a:t>8/15/25</a:t>
+              <a:t>8/19/25</a:t>
             </a:fld>
             <a:endParaRPr lang="en-US"/>
           </a:p>
@@ -6106,8 +6524,8 @@
           <a:chExt cx="0" cy="0"/>
         </a:xfrm>
       </p:grpSpPr>
-      <mc:AlternateContent xmlns:mc="http://schemas.openxmlformats.org/markup-compatibility/2006" xmlns:a14="http://schemas.microsoft.com/office/drawing/2010/main">
-        <mc:Choice Requires="a14">
+      <mc:AlternateContent xmlns:mc="http://schemas.openxmlformats.org/markup-compatibility/2006">
+        <mc:Choice xmlns:a14="http://schemas.microsoft.com/office/drawing/2010/main" Requires="a14">
           <p:sp>
             <p:nvSpPr>
               <p:cNvPr id="2" name="Title 1">
@@ -6124,7 +6542,12 @@
                 <p:ph type="title"/>
               </p:nvPr>
             </p:nvSpPr>
-            <p:spPr/>
+            <p:spPr>
+              <a:xfrm>
+                <a:off x="838200" y="365125"/>
+                <a:ext cx="10515600" cy="925655"/>
+              </a:xfrm>
+            </p:spPr>
             <p:txBody>
               <a:bodyPr/>
               <a:lstStyle/>
@@ -6157,7 +6580,7 @@
             </p:txBody>
           </p:sp>
         </mc:Choice>
-        <mc:Fallback xmlns="">
+        <mc:Fallback>
           <p:sp>
             <p:nvSpPr>
               <p:cNvPr id="2" name="Title 1">
@@ -6175,10 +6598,14 @@
               </p:nvPr>
             </p:nvSpPr>
             <p:spPr>
+              <a:xfrm>
+                <a:off x="838200" y="365125"/>
+                <a:ext cx="10515600" cy="925655"/>
+              </a:xfrm>
               <a:blipFill>
                 <a:blip r:embed="rId2"/>
                 <a:stretch>
-                  <a:fillRect l="-2413"/>
+                  <a:fillRect l="-2413" t="-6757" b="-20270"/>
                 </a:stretch>
               </a:blipFill>
             </p:spPr>
@@ -6220,7 +6647,7 @@
           <a:p>
             <a:fld id="{3B9977D7-0EE6-4641-8458-2B150046FE11}" type="datetime1">
               <a:rPr lang="en-US" smtClean="0"/>
-              <a:t>8/15/25</a:t>
+              <a:t>8/19/25</a:t>
             </a:fld>
             <a:endParaRPr lang="en-US"/>
           </a:p>
@@ -6269,7 +6696,7 @@
         </p:nvSpPr>
         <p:spPr>
           <a:xfrm>
-            <a:off x="89767" y="1290780"/>
+            <a:off x="89767" y="1173213"/>
             <a:ext cx="12180963" cy="5632311"/>
           </a:xfrm>
           <a:prstGeom prst="rect">
@@ -6875,8 +7302,8 @@
           </a:p>
         </p:txBody>
       </p:sp>
-      <mc:AlternateContent xmlns:mc="http://schemas.openxmlformats.org/markup-compatibility/2006">
-        <mc:Choice xmlns:a14="http://schemas.microsoft.com/office/drawing/2010/main" Requires="a14">
+      <mc:AlternateContent xmlns:mc="http://schemas.openxmlformats.org/markup-compatibility/2006" xmlns:a14="http://schemas.microsoft.com/office/drawing/2010/main">
+        <mc:Choice Requires="a14">
           <p:sp>
             <p:nvSpPr>
               <p:cNvPr id="6" name="TextBox 5">
@@ -6999,7 +7426,7 @@
             </p:txBody>
           </p:sp>
         </mc:Choice>
-        <mc:Fallback>
+        <mc:Fallback xmlns="">
           <p:sp>
             <p:nvSpPr>
               <p:cNvPr id="6" name="TextBox 5">
@@ -7080,8 +7507,8 @@
           <a:chExt cx="0" cy="0"/>
         </a:xfrm>
       </p:grpSpPr>
-      <mc:AlternateContent xmlns:mc="http://schemas.openxmlformats.org/markup-compatibility/2006">
-        <mc:Choice xmlns:a14="http://schemas.microsoft.com/office/drawing/2010/main" Requires="a14">
+      <mc:AlternateContent xmlns:mc="http://schemas.openxmlformats.org/markup-compatibility/2006" xmlns:a14="http://schemas.microsoft.com/office/drawing/2010/main">
+        <mc:Choice Requires="a14">
           <p:sp>
             <p:nvSpPr>
               <p:cNvPr id="2" name="Title 1">
@@ -7131,7 +7558,7 @@
             </p:txBody>
           </p:sp>
         </mc:Choice>
-        <mc:Fallback>
+        <mc:Fallback xmlns="">
           <p:sp>
             <p:nvSpPr>
               <p:cNvPr id="2" name="Title 1">
@@ -7194,7 +7621,7 @@
           <a:p>
             <a:fld id="{3B9977D7-0EE6-4641-8458-2B150046FE11}" type="datetime1">
               <a:rPr lang="en-US" smtClean="0"/>
-              <a:t>8/15/25</a:t>
+              <a:t>8/19/25</a:t>
             </a:fld>
             <a:endParaRPr lang="en-US"/>
           </a:p>
@@ -7663,9 +8090,16 @@
             <p:ph type="title"/>
           </p:nvPr>
         </p:nvSpPr>
-        <p:spPr/>
-        <p:txBody>
-          <a:bodyPr/>
+        <p:spPr>
+          <a:xfrm>
+            <a:off x="803828" y="167138"/>
+            <a:ext cx="10515600" cy="424565"/>
+          </a:xfrm>
+        </p:spPr>
+        <p:txBody>
+          <a:bodyPr>
+            <a:normAutofit fontScale="90000"/>
+          </a:bodyPr>
           <a:lstStyle/>
           <a:p>
             <a:r>
@@ -7688,10 +8122,6 @@
               <a:rPr lang="en-US" dirty="0"/>
               <a:t> 11224</a:t>
             </a:r>
-            <a:br>
-              <a:rPr lang="en-US" dirty="0"/>
-            </a:br>
-            <a:endParaRPr lang="en-US" dirty="0"/>
           </a:p>
         </p:txBody>
       </p:sp>
@@ -7767,7 +8197,7 @@
         </p:nvGrpSpPr>
         <p:grpSpPr>
           <a:xfrm>
-            <a:off x="288530" y="1309816"/>
+            <a:off x="288530" y="1558013"/>
             <a:ext cx="7100811" cy="4888098"/>
             <a:chOff x="300887" y="758217"/>
             <a:chExt cx="7772400" cy="5170008"/>
@@ -7998,7 +8428,7 @@
         </p:blipFill>
         <p:spPr>
           <a:xfrm>
-            <a:off x="8177437" y="3719384"/>
+            <a:off x="8177437" y="3967581"/>
             <a:ext cx="3186934" cy="2128694"/>
           </a:xfrm>
           <a:prstGeom prst="rect">
@@ -8022,7 +8452,7 @@
             </p:nvSpPr>
             <p:spPr>
               <a:xfrm>
-                <a:off x="7466934" y="1651699"/>
+                <a:off x="7466934" y="1899896"/>
                 <a:ext cx="4335482" cy="276999"/>
               </a:xfrm>
               <a:prstGeom prst="rect">
@@ -8129,7 +8559,7 @@
             </p:nvSpPr>
             <p:spPr>
               <a:xfrm>
-                <a:off x="7466934" y="1651699"/>
+                <a:off x="7466934" y="1899896"/>
                 <a:ext cx="4335482" cy="276999"/>
               </a:xfrm>
               <a:prstGeom prst="rect">
@@ -8138,7 +8568,7 @@
               <a:blipFill>
                 <a:blip r:embed="rId4"/>
                 <a:stretch>
-                  <a:fillRect l="-1170" t="-22727" b="-45455"/>
+                  <a:fillRect l="-1170" t="-21739" b="-39130"/>
                 </a:stretch>
               </a:blipFill>
             </p:spPr>
@@ -8173,7 +8603,7 @@
             </p:nvSpPr>
             <p:spPr>
               <a:xfrm>
-                <a:off x="8374802" y="2010065"/>
+                <a:off x="8374802" y="2258262"/>
                 <a:ext cx="3408562" cy="276999"/>
               </a:xfrm>
               <a:prstGeom prst="rect">
@@ -8231,13 +8661,7 @@
                             <a:rPr lang="en-US" b="0" i="1" smtClean="0">
                               <a:latin typeface="Cambria Math" panose="02040503050406030204" pitchFamily="18" charset="0"/>
                             </a:rPr>
-                            <m:t>24963.798</m:t>
-                          </m:r>
-                          <m:r>
-                            <a:rPr lang="en-US" b="0" i="1" smtClean="0">
-                              <a:latin typeface="Cambria Math" panose="02040503050406030204" pitchFamily="18" charset="0"/>
-                            </a:rPr>
-                            <m:t>±</m:t>
+                            <m:t>24963.798±</m:t>
                           </m:r>
                           <m:r>
                             <a:rPr lang="en-US" i="1">
@@ -8278,7 +8702,7 @@
             </p:nvSpPr>
             <p:spPr>
               <a:xfrm>
-                <a:off x="8374802" y="2010065"/>
+                <a:off x="8374802" y="2258262"/>
                 <a:ext cx="3408562" cy="276999"/>
               </a:xfrm>
               <a:prstGeom prst="rect">
@@ -8287,7 +8711,7 @@
               <a:blipFill>
                 <a:blip r:embed="rId5"/>
                 <a:stretch>
-                  <a:fillRect l="-1115" t="-9091" b="-40909"/>
+                  <a:fillRect l="-1115" t="-4348" b="-34783"/>
                 </a:stretch>
               </a:blipFill>
             </p:spPr>
@@ -8322,7 +8746,7 @@
             </p:nvSpPr>
             <p:spPr>
               <a:xfrm>
-                <a:off x="8214646" y="2368431"/>
+                <a:off x="8214646" y="2616628"/>
                 <a:ext cx="3447034" cy="276999"/>
               </a:xfrm>
               <a:prstGeom prst="rect">
@@ -8421,7 +8845,7 @@
             </p:nvSpPr>
             <p:spPr>
               <a:xfrm>
-                <a:off x="8214646" y="2368431"/>
+                <a:off x="8214646" y="2616628"/>
                 <a:ext cx="3447034" cy="276999"/>
               </a:xfrm>
               <a:prstGeom prst="rect">
@@ -8430,7 +8854,7 @@
               <a:blipFill>
                 <a:blip r:embed="rId6"/>
                 <a:stretch>
-                  <a:fillRect l="-1471" t="-8696" b="-34783"/>
+                  <a:fillRect l="-1471" t="-4167" b="-33333"/>
                 </a:stretch>
               </a:blipFill>
             </p:spPr>
@@ -8465,7 +8889,7 @@
             </p:nvSpPr>
             <p:spPr>
               <a:xfrm>
-                <a:off x="8147386" y="2700263"/>
+                <a:off x="8147386" y="2948460"/>
                 <a:ext cx="3640740" cy="276999"/>
               </a:xfrm>
               <a:prstGeom prst="rect">
@@ -8535,19 +8959,7 @@
                             <a:rPr lang="en-US" b="0" i="1" smtClean="0">
                               <a:latin typeface="Cambria Math" panose="02040503050406030204" pitchFamily="18" charset="0"/>
                             </a:rPr>
-                            <m:t>34966</m:t>
-                          </m:r>
-                          <m:r>
-                            <a:rPr lang="en-US" b="0" i="1" smtClean="0">
-                              <a:latin typeface="Cambria Math" panose="02040503050406030204" pitchFamily="18" charset="0"/>
-                            </a:rPr>
-                            <m:t>.595</m:t>
-                          </m:r>
-                          <m:r>
-                            <a:rPr lang="en-US" b="0" i="1" smtClean="0">
-                              <a:latin typeface="Cambria Math" panose="02040503050406030204" pitchFamily="18" charset="0"/>
-                            </a:rPr>
-                            <m:t>±</m:t>
+                            <m:t>34966.595±</m:t>
                           </m:r>
                           <m:r>
                             <a:rPr lang="en-US" i="1">
@@ -8582,7 +8994,7 @@
             </p:nvSpPr>
             <p:spPr>
               <a:xfrm>
-                <a:off x="8147386" y="2700263"/>
+                <a:off x="8147386" y="2948460"/>
                 <a:ext cx="3640740" cy="276999"/>
               </a:xfrm>
               <a:prstGeom prst="rect">
@@ -8591,7 +9003,7 @@
               <a:blipFill>
                 <a:blip r:embed="rId7"/>
                 <a:stretch>
-                  <a:fillRect l="-1736" t="-8696" b="-34783"/>
+                  <a:fillRect l="-1736" t="-9091" b="-40909"/>
                 </a:stretch>
               </a:blipFill>
             </p:spPr>
@@ -8610,6 +9022,407 @@
           </p:sp>
         </mc:Fallback>
       </mc:AlternateContent>
+      <mc:AlternateContent xmlns:mc="http://schemas.openxmlformats.org/markup-compatibility/2006">
+        <mc:Choice xmlns:a14="http://schemas.microsoft.com/office/drawing/2010/main" Requires="a14">
+          <p:sp>
+            <p:nvSpPr>
+              <p:cNvPr id="6" name="TextBox 5">
+                <a:extLst>
+                  <a:ext uri="{FF2B5EF4-FFF2-40B4-BE49-F238E27FC236}">
+                    <a16:creationId xmlns:a16="http://schemas.microsoft.com/office/drawing/2014/main" id="{CEB3815D-8222-9124-AC5B-E8692CFAF191}"/>
+                  </a:ext>
+                </a:extLst>
+              </p:cNvPr>
+              <p:cNvSpPr txBox="1"/>
+              <p:nvPr/>
+            </p:nvSpPr>
+            <p:spPr>
+              <a:xfrm>
+                <a:off x="1478279" y="765328"/>
+                <a:ext cx="8553991" cy="844847"/>
+              </a:xfrm>
+              <a:prstGeom prst="rect">
+                <a:avLst/>
+              </a:prstGeom>
+              <a:noFill/>
+            </p:spPr>
+            <p:txBody>
+              <a:bodyPr wrap="square">
+                <a:spAutoFit/>
+              </a:bodyPr>
+              <a:lstStyle/>
+              <a:p>
+                <a:pPr marL="0" indent="0">
+                  <a:buNone/>
+                </a:pPr>
+                <a:r>
+                  <a:rPr lang="en-US" b="0" dirty="0"/>
+                  <a:t>“Corrected Data” = </a:t>
+                </a:r>
+                <a14:m>
+                  <m:oMath xmlns:m="http://schemas.openxmlformats.org/officeDocument/2006/math">
+                    <m:sSub>
+                      <m:sSubPr>
+                        <m:ctrlPr>
+                          <a:rPr lang="en-US" b="0" i="1" smtClean="0">
+                            <a:latin typeface="Cambria Math" panose="02040503050406030204" pitchFamily="18" charset="0"/>
+                          </a:rPr>
+                        </m:ctrlPr>
+                      </m:sSubPr>
+                      <m:e>
+                        <m:r>
+                          <a:rPr lang="en-US" b="0" i="1" smtClean="0">
+                            <a:latin typeface="Cambria Math" panose="02040503050406030204" pitchFamily="18" charset="0"/>
+                          </a:rPr>
+                          <m:t>𝑌</m:t>
+                        </m:r>
+                      </m:e>
+                      <m:sub>
+                        <m:r>
+                          <a:rPr lang="en-US" b="0" i="1" smtClean="0">
+                            <a:latin typeface="Cambria Math" panose="02040503050406030204" pitchFamily="18" charset="0"/>
+                          </a:rPr>
+                          <m:t>𝐿𝐻</m:t>
+                        </m:r>
+                        <m:r>
+                          <a:rPr lang="en-US" b="0" i="1" smtClean="0">
+                            <a:latin typeface="Cambria Math" panose="02040503050406030204" pitchFamily="18" charset="0"/>
+                          </a:rPr>
+                          <m:t>2</m:t>
+                        </m:r>
+                      </m:sub>
+                    </m:sSub>
+                    <m:r>
+                      <a:rPr lang="en-US" b="0" i="1" smtClean="0">
+                        <a:latin typeface="Cambria Math" panose="02040503050406030204" pitchFamily="18" charset="0"/>
+                      </a:rPr>
+                      <m:t>=[</m:t>
+                    </m:r>
+                    <m:sSub>
+                      <m:sSubPr>
+                        <m:ctrlPr>
+                          <a:rPr lang="en-US" b="0" i="1" smtClean="0">
+                            <a:latin typeface="Cambria Math" panose="02040503050406030204" pitchFamily="18" charset="0"/>
+                          </a:rPr>
+                        </m:ctrlPr>
+                      </m:sSubPr>
+                      <m:e>
+                        <m:r>
+                          <a:rPr lang="en-US" b="0" i="1" smtClean="0">
+                            <a:latin typeface="Cambria Math" panose="02040503050406030204" pitchFamily="18" charset="0"/>
+                          </a:rPr>
+                          <m:t>𝑌</m:t>
+                        </m:r>
+                      </m:e>
+                      <m:sub>
+                        <m:r>
+                          <a:rPr lang="en-US" b="0" i="1" smtClean="0">
+                            <a:latin typeface="Cambria Math" panose="02040503050406030204" pitchFamily="18" charset="0"/>
+                          </a:rPr>
+                          <m:t>𝑓𝑢𝑙𝑙</m:t>
+                        </m:r>
+                      </m:sub>
+                    </m:sSub>
+                    <m:r>
+                      <a:rPr lang="en-US" b="0" i="1" smtClean="0">
+                        <a:latin typeface="Cambria Math" panose="02040503050406030204" pitchFamily="18" charset="0"/>
+                      </a:rPr>
+                      <m:t>−</m:t>
+                    </m:r>
+                    <m:sSub>
+                      <m:sSubPr>
+                        <m:ctrlPr>
+                          <a:rPr lang="en-US" b="0" i="1" smtClean="0">
+                            <a:latin typeface="Cambria Math" panose="02040503050406030204" pitchFamily="18" charset="0"/>
+                          </a:rPr>
+                        </m:ctrlPr>
+                      </m:sSubPr>
+                      <m:e>
+                        <m:r>
+                          <a:rPr lang="en-US" b="0" i="1" smtClean="0">
+                            <a:latin typeface="Cambria Math" panose="02040503050406030204" pitchFamily="18" charset="0"/>
+                          </a:rPr>
+                          <m:t>𝑌</m:t>
+                        </m:r>
+                      </m:e>
+                      <m:sub>
+                        <m:r>
+                          <a:rPr lang="en-US" b="0" i="1" smtClean="0">
+                            <a:latin typeface="Cambria Math" panose="02040503050406030204" pitchFamily="18" charset="0"/>
+                          </a:rPr>
+                          <m:t>𝑓𝑢𝑙𝑙</m:t>
+                        </m:r>
+                        <m:r>
+                          <a:rPr lang="en-US" b="0" i="1" smtClean="0">
+                            <a:latin typeface="Cambria Math" panose="02040503050406030204" pitchFamily="18" charset="0"/>
+                          </a:rPr>
+                          <m:t>,   </m:t>
+                        </m:r>
+                        <m:r>
+                          <a:rPr lang="en-US" b="0" i="1" smtClean="0">
+                            <a:latin typeface="Cambria Math" panose="02040503050406030204" pitchFamily="18" charset="0"/>
+                          </a:rPr>
+                          <m:t>𝑚𝑖𝑥𝑒𝑑</m:t>
+                        </m:r>
+                      </m:sub>
+                    </m:sSub>
+                    <m:r>
+                      <a:rPr lang="en-US" b="0" i="1" smtClean="0">
+                        <a:latin typeface="Cambria Math" panose="02040503050406030204" pitchFamily="18" charset="0"/>
+                      </a:rPr>
+                      <m:t>]−</m:t>
+                    </m:r>
+                    <m:f>
+                      <m:fPr>
+                        <m:ctrlPr>
+                          <a:rPr lang="en-US" b="0" i="1" smtClean="0">
+                            <a:latin typeface="Cambria Math" panose="02040503050406030204" pitchFamily="18" charset="0"/>
+                          </a:rPr>
+                        </m:ctrlPr>
+                      </m:fPr>
+                      <m:num>
+                        <m:r>
+                          <a:rPr lang="en-US" b="0" i="1" smtClean="0">
+                            <a:latin typeface="Cambria Math" panose="02040503050406030204" pitchFamily="18" charset="0"/>
+                          </a:rPr>
+                          <m:t>𝑃𝑂</m:t>
+                        </m:r>
+                        <m:sSub>
+                          <m:sSubPr>
+                            <m:ctrlPr>
+                              <a:rPr lang="en-US" b="0" i="1" smtClean="0">
+                                <a:latin typeface="Cambria Math" panose="02040503050406030204" pitchFamily="18" charset="0"/>
+                              </a:rPr>
+                            </m:ctrlPr>
+                          </m:sSubPr>
+                          <m:e>
+                            <m:r>
+                              <a:rPr lang="en-US" b="0" i="1" smtClean="0">
+                                <a:latin typeface="Cambria Math" panose="02040503050406030204" pitchFamily="18" charset="0"/>
+                              </a:rPr>
+                              <m:t>𝑇</m:t>
+                            </m:r>
+                          </m:e>
+                          <m:sub>
+                            <m:r>
+                              <a:rPr lang="en-US" b="0" i="1" smtClean="0">
+                                <a:latin typeface="Cambria Math" panose="02040503050406030204" pitchFamily="18" charset="0"/>
+                              </a:rPr>
+                              <m:t>𝑓𝑢𝑙𝑙</m:t>
+                            </m:r>
+                          </m:sub>
+                        </m:sSub>
+                      </m:num>
+                      <m:den>
+                        <m:r>
+                          <a:rPr lang="en-US" b="0" i="1" smtClean="0">
+                            <a:latin typeface="Cambria Math" panose="02040503050406030204" pitchFamily="18" charset="0"/>
+                          </a:rPr>
+                          <m:t>𝑃𝑂</m:t>
+                        </m:r>
+                        <m:sSub>
+                          <m:sSubPr>
+                            <m:ctrlPr>
+                              <a:rPr lang="en-US" b="0" i="1" smtClean="0">
+                                <a:latin typeface="Cambria Math" panose="02040503050406030204" pitchFamily="18" charset="0"/>
+                              </a:rPr>
+                            </m:ctrlPr>
+                          </m:sSubPr>
+                          <m:e>
+                            <m:r>
+                              <a:rPr lang="en-US" b="0" i="1" smtClean="0">
+                                <a:latin typeface="Cambria Math" panose="02040503050406030204" pitchFamily="18" charset="0"/>
+                              </a:rPr>
+                              <m:t>𝑇</m:t>
+                            </m:r>
+                          </m:e>
+                          <m:sub>
+                            <m:r>
+                              <a:rPr lang="en-US" b="0" i="1" smtClean="0">
+                                <a:latin typeface="Cambria Math" panose="02040503050406030204" pitchFamily="18" charset="0"/>
+                              </a:rPr>
+                              <m:t>𝑒𝑚𝑝𝑡𝑦</m:t>
+                            </m:r>
+                          </m:sub>
+                        </m:sSub>
+                      </m:den>
+                    </m:f>
+                    <m:r>
+                      <a:rPr lang="en-US" b="0" i="1" smtClean="0">
+                        <a:latin typeface="Cambria Math" panose="02040503050406030204" pitchFamily="18" charset="0"/>
+                      </a:rPr>
+                      <m:t> [</m:t>
+                    </m:r>
+                    <m:sSub>
+                      <m:sSubPr>
+                        <m:ctrlPr>
+                          <a:rPr lang="en-US" b="0" i="1" smtClean="0">
+                            <a:latin typeface="Cambria Math" panose="02040503050406030204" pitchFamily="18" charset="0"/>
+                          </a:rPr>
+                        </m:ctrlPr>
+                      </m:sSubPr>
+                      <m:e>
+                        <m:r>
+                          <a:rPr lang="en-US" b="0" i="1" smtClean="0">
+                            <a:latin typeface="Cambria Math" panose="02040503050406030204" pitchFamily="18" charset="0"/>
+                          </a:rPr>
+                          <m:t>𝑌</m:t>
+                        </m:r>
+                      </m:e>
+                      <m:sub>
+                        <m:r>
+                          <a:rPr lang="en-US" b="0" i="1" smtClean="0">
+                            <a:latin typeface="Cambria Math" panose="02040503050406030204" pitchFamily="18" charset="0"/>
+                          </a:rPr>
+                          <m:t>𝑒𝑚𝑝𝑡𝑦</m:t>
+                        </m:r>
+                      </m:sub>
+                    </m:sSub>
+                    <m:r>
+                      <a:rPr lang="en-US" b="0" i="1" smtClean="0">
+                        <a:latin typeface="Cambria Math" panose="02040503050406030204" pitchFamily="18" charset="0"/>
+                      </a:rPr>
+                      <m:t>−</m:t>
+                    </m:r>
+                    <m:sSub>
+                      <m:sSubPr>
+                        <m:ctrlPr>
+                          <a:rPr lang="en-US" b="0" i="1" smtClean="0">
+                            <a:latin typeface="Cambria Math" panose="02040503050406030204" pitchFamily="18" charset="0"/>
+                          </a:rPr>
+                        </m:ctrlPr>
+                      </m:sSubPr>
+                      <m:e>
+                        <m:r>
+                          <a:rPr lang="en-US" b="0" i="1" smtClean="0">
+                            <a:latin typeface="Cambria Math" panose="02040503050406030204" pitchFamily="18" charset="0"/>
+                          </a:rPr>
+                          <m:t>𝑌</m:t>
+                        </m:r>
+                      </m:e>
+                      <m:sub>
+                        <m:r>
+                          <a:rPr lang="en-US" b="0" i="1" smtClean="0">
+                            <a:latin typeface="Cambria Math" panose="02040503050406030204" pitchFamily="18" charset="0"/>
+                          </a:rPr>
+                          <m:t>𝑒𝑚𝑝𝑡𝑦</m:t>
+                        </m:r>
+                        <m:r>
+                          <a:rPr lang="en-US" b="0" i="1" smtClean="0">
+                            <a:latin typeface="Cambria Math" panose="02040503050406030204" pitchFamily="18" charset="0"/>
+                          </a:rPr>
+                          <m:t>,  </m:t>
+                        </m:r>
+                        <m:r>
+                          <a:rPr lang="en-US" b="0" i="1" smtClean="0">
+                            <a:latin typeface="Cambria Math" panose="02040503050406030204" pitchFamily="18" charset="0"/>
+                          </a:rPr>
+                          <m:t>𝑚𝑖𝑥𝑒𝑑</m:t>
+                        </m:r>
+                      </m:sub>
+                    </m:sSub>
+                    <m:r>
+                      <a:rPr lang="en-US" b="0" i="1" smtClean="0">
+                        <a:latin typeface="Cambria Math" panose="02040503050406030204" pitchFamily="18" charset="0"/>
+                      </a:rPr>
+                      <m:t>]</m:t>
+                    </m:r>
+                  </m:oMath>
+                </a14:m>
+                <a:endParaRPr lang="en-US" dirty="0"/>
+              </a:p>
+              <a:p>
+                <a:pPr marL="0" indent="0">
+                  <a:buNone/>
+                </a:pPr>
+                <a:r>
+                  <a:rPr lang="en-US" dirty="0"/>
+                  <a:t>The fit was limited to M&gt;3 GeV to obtain a better fit in the DY region 4.2&lt;M&lt;8.8 GeV.</a:t>
+                </a:r>
+              </a:p>
+            </p:txBody>
+          </p:sp>
+        </mc:Choice>
+        <mc:Fallback>
+          <p:sp>
+            <p:nvSpPr>
+              <p:cNvPr id="6" name="TextBox 5">
+                <a:extLst>
+                  <a:ext uri="{FF2B5EF4-FFF2-40B4-BE49-F238E27FC236}">
+                    <a16:creationId xmlns:a16="http://schemas.microsoft.com/office/drawing/2014/main" id="{CEB3815D-8222-9124-AC5B-E8692CFAF191}"/>
+                  </a:ext>
+                </a:extLst>
+              </p:cNvPr>
+              <p:cNvSpPr txBox="1">
+                <a:spLocks noRot="1" noChangeAspect="1" noMove="1" noResize="1" noEditPoints="1" noAdjustHandles="1" noChangeArrowheads="1" noChangeShapeType="1" noTextEdit="1"/>
+              </p:cNvSpPr>
+              <p:nvPr/>
+            </p:nvSpPr>
+            <p:spPr>
+              <a:xfrm>
+                <a:off x="1478279" y="765328"/>
+                <a:ext cx="8553991" cy="844847"/>
+              </a:xfrm>
+              <a:prstGeom prst="rect">
+                <a:avLst/>
+              </a:prstGeom>
+              <a:blipFill>
+                <a:blip r:embed="rId8"/>
+                <a:stretch>
+                  <a:fillRect l="-593" b="-10448"/>
+                </a:stretch>
+              </a:blipFill>
+            </p:spPr>
+            <p:txBody>
+              <a:bodyPr/>
+              <a:lstStyle/>
+              <a:p>
+                <a:r>
+                  <a:rPr lang="en-US">
+                    <a:noFill/>
+                  </a:rPr>
+                  <a:t> </a:t>
+                </a:r>
+              </a:p>
+            </p:txBody>
+          </p:sp>
+        </mc:Fallback>
+      </mc:AlternateContent>
+      <p:sp>
+        <p:nvSpPr>
+          <p:cNvPr id="7" name="TextBox 6">
+            <a:extLst>
+              <a:ext uri="{FF2B5EF4-FFF2-40B4-BE49-F238E27FC236}">
+                <a16:creationId xmlns:a16="http://schemas.microsoft.com/office/drawing/2014/main" id="{6F57C0EF-4C4F-78F5-3C1C-BC37FE1F1C8C}"/>
+              </a:ext>
+            </a:extLst>
+          </p:cNvPr>
+          <p:cNvSpPr txBox="1"/>
+          <p:nvPr/>
+        </p:nvSpPr>
+        <p:spPr>
+          <a:xfrm>
+            <a:off x="8453175" y="3598249"/>
+            <a:ext cx="2683812" cy="369332"/>
+          </a:xfrm>
+          <a:prstGeom prst="rect">
+            <a:avLst/>
+          </a:prstGeom>
+          <a:noFill/>
+        </p:spPr>
+        <p:txBody>
+          <a:bodyPr wrap="none" rtlCol="0">
+            <a:spAutoFit/>
+          </a:bodyPr>
+          <a:lstStyle/>
+          <a:p>
+            <a:r>
+              <a:rPr lang="en-US" dirty="0"/>
+              <a:t>DY region 4.2&lt;M&lt;8.8 GeV</a:t>
+            </a:r>
+          </a:p>
+        </p:txBody>
+      </p:sp>
     </p:spTree>
     <p:extLst>
       <p:ext uri="{BB962C8B-B14F-4D97-AF65-F5344CB8AC3E}">
@@ -8676,8 +9489,8 @@
           </a:prstGeom>
         </p:spPr>
       </p:pic>
-      <mc:AlternateContent xmlns:mc="http://schemas.openxmlformats.org/markup-compatibility/2006">
-        <mc:Choice xmlns:a14="http://schemas.microsoft.com/office/drawing/2010/main" Requires="a14">
+      <mc:AlternateContent xmlns:mc="http://schemas.openxmlformats.org/markup-compatibility/2006" xmlns:a14="http://schemas.microsoft.com/office/drawing/2010/main">
+        <mc:Choice Requires="a14">
           <p:sp>
             <p:nvSpPr>
               <p:cNvPr id="17" name="Title 1">
@@ -8744,6 +9557,7 @@
                             <a:solidFill>
                               <a:schemeClr val="tx1"/>
                             </a:solidFill>
+                            <a:latin typeface="Cambria Math" panose="02040503050406030204" pitchFamily="18" charset="0"/>
                             <a:cs typeface="Arial" panose="020B0604020202020204" pitchFamily="34" charset="0"/>
                           </a:rPr>
                         </m:ctrlPr>
@@ -8754,6 +9568,7 @@
                             <a:solidFill>
                               <a:schemeClr val="tx1"/>
                             </a:solidFill>
+                            <a:latin typeface="Cambria Math" panose="02040503050406030204" pitchFamily="18" charset="0"/>
                             <a:cs typeface="Arial" panose="020B0604020202020204" pitchFamily="34" charset="0"/>
                           </a:rPr>
                           <m:t>𝜓</m:t>
@@ -8765,6 +9580,7 @@
                             <a:solidFill>
                               <a:schemeClr val="tx1"/>
                             </a:solidFill>
+                            <a:latin typeface="Cambria Math" panose="02040503050406030204" pitchFamily="18" charset="0"/>
                             <a:cs typeface="Arial" panose="020B0604020202020204" pitchFamily="34" charset="0"/>
                           </a:rPr>
                           <m:t>′</m:t>
@@ -8786,7 +9602,7 @@
             </p:txBody>
           </p:sp>
         </mc:Choice>
-        <mc:Fallback>
+        <mc:Fallback xmlns="">
           <p:sp>
             <p:nvSpPr>
               <p:cNvPr id="17" name="Title 1">
@@ -8914,7 +9730,7 @@
         </p:blipFill>
         <p:spPr>
           <a:xfrm>
-            <a:off x="7562720" y="4898310"/>
+            <a:off x="6327882" y="4898310"/>
             <a:ext cx="3256572" cy="1725308"/>
           </a:xfrm>
           <a:prstGeom prst="rect">
@@ -8937,7 +9753,7 @@
         <p:spPr>
           <a:xfrm>
             <a:off x="765651" y="4506441"/>
-            <a:ext cx="3783665" cy="369332"/>
+            <a:ext cx="3830921" cy="369332"/>
           </a:xfrm>
           <a:prstGeom prst="rect">
             <a:avLst/>
@@ -8958,7 +9774,10 @@
               <a:rPr lang="en-US" dirty="0" err="1"/>
               <a:t>TFractionFitter</a:t>
             </a:r>
-            <a:endParaRPr lang="en-US" dirty="0"/>
+            <a:r>
+              <a:rPr lang="en-US" dirty="0"/>
+              <a:t>.</a:t>
+            </a:r>
           </a:p>
         </p:txBody>
       </p:sp>
@@ -8977,7 +9796,7 @@
         <p:spPr>
           <a:xfrm>
             <a:off x="6252102" y="4569195"/>
-            <a:ext cx="5489195" cy="369332"/>
+            <a:ext cx="5268622" cy="369332"/>
           </a:xfrm>
           <a:prstGeom prst="rect">
             <a:avLst/>
@@ -9000,7 +9819,15 @@
             </a:r>
             <a:r>
               <a:rPr lang="en-US" dirty="0"/>
-              <a:t> using different technique</a:t>
+              <a:t> using </a:t>
+            </a:r>
+            <a:r>
+              <a:rPr lang="en-US" dirty="0" err="1"/>
+              <a:t>SciPY</a:t>
+            </a:r>
+            <a:r>
+              <a:rPr lang="en-US" dirty="0"/>
+              <a:t> technique.</a:t>
             </a:r>
           </a:p>
         </p:txBody>
@@ -9070,6 +9897,49 @@
               <a:t>8</a:t>
             </a:fld>
             <a:endParaRPr lang="en-US" dirty="0"/>
+          </a:p>
+        </p:txBody>
+      </p:sp>
+      <p:sp>
+        <p:nvSpPr>
+          <p:cNvPr id="4" name="TextBox 3">
+            <a:extLst>
+              <a:ext uri="{FF2B5EF4-FFF2-40B4-BE49-F238E27FC236}">
+                <a16:creationId xmlns:a16="http://schemas.microsoft.com/office/drawing/2014/main" id="{60C075EB-0A2D-CD62-893D-51F901CF9B87}"/>
+              </a:ext>
+            </a:extLst>
+          </p:cNvPr>
+          <p:cNvSpPr txBox="1"/>
+          <p:nvPr/>
+        </p:nvSpPr>
+        <p:spPr>
+          <a:xfrm>
+            <a:off x="9584453" y="5082220"/>
+            <a:ext cx="2497763" cy="1200329"/>
+          </a:xfrm>
+          <a:prstGeom prst="rect">
+            <a:avLst/>
+          </a:prstGeom>
+          <a:noFill/>
+        </p:spPr>
+        <p:txBody>
+          <a:bodyPr wrap="square" rtlCol="0">
+            <a:spAutoFit/>
+          </a:bodyPr>
+          <a:lstStyle/>
+          <a:p>
+            <a:r>
+              <a:rPr lang="en-US" dirty="0"/>
+              <a:t>Results are very similar; </a:t>
+            </a:r>
+            <a:r>
+              <a:rPr lang="en-US" dirty="0" err="1"/>
+              <a:t>SciPY</a:t>
+            </a:r>
+            <a:r>
+              <a:rPr lang="en-US" dirty="0"/>
+              <a:t> routine does not adjust the templates as TFF does.</a:t>
+            </a:r>
           </a:p>
         </p:txBody>
       </p:sp>
@@ -9323,8 +10193,8 @@
         </p:blipFill>
         <p:spPr>
           <a:xfrm>
-            <a:off x="6938530" y="5023644"/>
-            <a:ext cx="2971800" cy="1578049"/>
+            <a:off x="5902682" y="4937416"/>
+            <a:ext cx="3134186" cy="1664277"/>
           </a:xfrm>
           <a:prstGeom prst="rect">
             <a:avLst/>
@@ -9353,7 +10223,7 @@
         </p:blipFill>
         <p:spPr>
           <a:xfrm>
-            <a:off x="967196" y="4980531"/>
+            <a:off x="2435785" y="4937416"/>
             <a:ext cx="3082290" cy="1664277"/>
           </a:xfrm>
           <a:prstGeom prst="rect">
@@ -9375,8 +10245,8 @@
         </p:nvSpPr>
         <p:spPr>
           <a:xfrm>
-            <a:off x="0" y="4693420"/>
-            <a:ext cx="6254276" cy="276999"/>
+            <a:off x="0" y="4869899"/>
+            <a:ext cx="2435784" cy="646331"/>
           </a:xfrm>
           <a:prstGeom prst="rect">
             <a:avLst/>
@@ -9384,18 +10254,26 @@
           <a:noFill/>
         </p:spPr>
         <p:txBody>
-          <a:bodyPr wrap="none" rtlCol="0">
+          <a:bodyPr wrap="square" rtlCol="0">
             <a:spAutoFit/>
           </a:bodyPr>
           <a:lstStyle/>
           <a:p>
             <a:r>
               <a:rPr lang="en-US" sz="1200" dirty="0" err="1"/>
-              <a:t>MassFit</a:t>
+              <a:t>SciPY</a:t>
             </a:r>
             <a:r>
               <a:rPr lang="en-US" sz="1200" dirty="0"/>
-              <a:t> by integrating NMSU mixed events without subtracting combinatorics in empty flask</a:t>
+              <a:t> mass-fit using NMSU mixed events </a:t>
+            </a:r>
+            <a:r>
+              <a:rPr lang="en-US" sz="1200" b="1" dirty="0"/>
+              <a:t>without</a:t>
+            </a:r>
+            <a:r>
+              <a:rPr lang="en-US" sz="1200" dirty="0"/>
+              <a:t> subtracting combinatorics in empty flask.</a:t>
             </a:r>
           </a:p>
         </p:txBody>
@@ -9414,8 +10292,8 @@
         </p:nvSpPr>
         <p:spPr>
           <a:xfrm>
-            <a:off x="6251238" y="4781886"/>
-            <a:ext cx="5948103" cy="276999"/>
+            <a:off x="9036869" y="4781886"/>
+            <a:ext cx="2743200" cy="1569660"/>
           </a:xfrm>
           <a:prstGeom prst="rect">
             <a:avLst/>
@@ -9423,18 +10301,35 @@
           <a:noFill/>
         </p:spPr>
         <p:txBody>
-          <a:bodyPr wrap="none" rtlCol="0">
+          <a:bodyPr wrap="square" rtlCol="0">
             <a:spAutoFit/>
           </a:bodyPr>
           <a:lstStyle/>
           <a:p>
             <a:r>
               <a:rPr lang="en-US" sz="1200" dirty="0" err="1"/>
-              <a:t>MassFit</a:t>
+              <a:t>SciPY</a:t>
             </a:r>
             <a:r>
               <a:rPr lang="en-US" sz="1200" dirty="0"/>
-              <a:t> by integrating NMSU mixed events by subtracting combinatorics in empty flask</a:t>
+              <a:t> mass-fit using NMSU mixed events </a:t>
+            </a:r>
+            <a:r>
+              <a:rPr lang="en-US" sz="1200" b="1" dirty="0"/>
+              <a:t>including</a:t>
+            </a:r>
+            <a:r>
+              <a:rPr lang="en-US" sz="1200" dirty="0"/>
+              <a:t> subtracting combinatorics in empty flask.</a:t>
+            </a:r>
+          </a:p>
+          <a:p>
+            <a:endParaRPr lang="en-US" sz="1200" dirty="0"/>
+          </a:p>
+          <a:p>
+            <a:r>
+              <a:rPr lang="en-US" sz="1200" dirty="0"/>
+              <a:t>The result for J/psi, psi’ and DY is identical because the LH2 mixed and flask mixed distributions have the same shape (next page).</a:t>
             </a:r>
           </a:p>
         </p:txBody>

</xml_diff>